<commit_message>
Banner versão atualizada em PowerPoint (.pptx)
</commit_message>
<xml_diff>
--- a/documentos/Banner_FECAP_2025_CupomGO.pptx
+++ b/documentos/Banner_FECAP_2025_CupomGO.pptx
@@ -257,7 +257,7 @@
       </p15:sldGuideLst>
     </p:ext>
     <p:ext uri="GoogleSlidesCustomDataVersion2">
-      <go:slidesCustomData xmlns:go="http://customooxmlschemas.google.com/" r:id="rId7" roundtripDataSignature="AMtx7mjrGzw5Ib/D0+NTK/D9JdCoVOod6g=="/>
+      <go:slidesCustomData xmlns:go="http://customooxmlschemas.google.com/" r:id="rId7" roundtripDataSignature="AMtx7mhI/bJTxh/ijdQrkZqsTvPEWYdbqQ=="/>
     </p:ext>
   </p:extLst>
 </p:presentation>
@@ -1450,7 +1450,7 @@
       </p:grpSpPr>
       <p:sp>
         <p:nvSpPr>
-          <p:cNvPr id="85" name="Google Shape;85;p1:notes"/>
+          <p:cNvPr id="85" name="Google Shape;85;g3a237dcfe8c_0_0:notes"/>
           <p:cNvSpPr/>
           <p:nvPr>
             <p:ph idx="2" type="sldImg"/>
@@ -1489,7 +1489,7 @@
       </p:sp>
       <p:sp>
         <p:nvSpPr>
-          <p:cNvPr id="86" name="Google Shape;86;p1:notes"/>
+          <p:cNvPr id="86" name="Google Shape;86;g3a237dcfe8c_0_0:notes"/>
           <p:cNvSpPr txBox="1"/>
           <p:nvPr>
             <p:ph idx="1" type="body"/>
@@ -1532,7 +1532,7 @@
       </p:sp>
       <p:sp>
         <p:nvSpPr>
-          <p:cNvPr id="87" name="Google Shape;87;p1:notes"/>
+          <p:cNvPr id="87" name="Google Shape;87;g3a237dcfe8c_0_0:notes"/>
           <p:cNvSpPr txBox="1"/>
           <p:nvPr>
             <p:ph idx="12" type="sldNum"/>
@@ -12376,7 +12376,7 @@
       </p:grpSpPr>
       <p:pic>
         <p:nvPicPr>
-          <p:cNvPr id="89" name="Google Shape;89;p1"/>
+          <p:cNvPr id="89" name="Google Shape;89;g3a237dcfe8c_0_0"/>
           <p:cNvPicPr preferRelativeResize="0"/>
           <p:nvPr/>
         </p:nvPicPr>
@@ -12403,14 +12403,14 @@
       </p:pic>
       <p:sp>
         <p:nvSpPr>
-          <p:cNvPr id="90" name="Google Shape;90;p1"/>
+          <p:cNvPr id="90" name="Google Shape;90;g3a237dcfe8c_0_0"/>
           <p:cNvSpPr/>
           <p:nvPr/>
         </p:nvSpPr>
         <p:spPr>
           <a:xfrm>
             <a:off x="-36734" y="2703684"/>
-            <a:ext cx="28800425" cy="666786"/>
+            <a:ext cx="28800300" cy="666900"/>
           </a:xfrm>
           <a:prstGeom prst="rect">
             <a:avLst/>
@@ -12422,7 +12422,7 @@
         </p:spPr>
         <p:txBody>
           <a:bodyPr anchorCtr="0" anchor="ctr" bIns="45700" lIns="91425" spcFirstLastPara="1" rIns="91425" wrap="square" tIns="45700">
-            <a:spAutoFit/>
+            <a:noAutofit/>
           </a:bodyPr>
           <a:lstStyle/>
           <a:p>
@@ -12449,7 +12449,7 @@
       </p:sp>
       <p:sp>
         <p:nvSpPr>
-          <p:cNvPr id="91" name="Google Shape;91;p1"/>
+          <p:cNvPr id="91" name="Google Shape;91;g3a237dcfe8c_0_0"/>
           <p:cNvSpPr txBox="1"/>
           <p:nvPr/>
         </p:nvSpPr>
@@ -12624,14 +12624,14 @@
       </p:sp>
       <p:sp>
         <p:nvSpPr>
-          <p:cNvPr id="92" name="Google Shape;92;p1"/>
+          <p:cNvPr id="92" name="Google Shape;92;g3a237dcfe8c_0_0"/>
           <p:cNvSpPr/>
           <p:nvPr/>
         </p:nvSpPr>
         <p:spPr>
           <a:xfrm>
             <a:off x="0" y="-669350"/>
-            <a:ext cx="184731" cy="1338700"/>
+            <a:ext cx="184800" cy="1338600"/>
           </a:xfrm>
           <a:prstGeom prst="rect">
             <a:avLst/>
@@ -12643,7 +12643,7 @@
         </p:spPr>
         <p:txBody>
           <a:bodyPr anchorCtr="0" anchor="ctr" bIns="45700" lIns="91425" spcFirstLastPara="1" rIns="91425" wrap="square" tIns="45700">
-            <a:spAutoFit/>
+            <a:noAutofit/>
           </a:bodyPr>
           <a:lstStyle/>
           <a:p>
@@ -12678,7 +12678,7 @@
       </p:sp>
       <p:sp>
         <p:nvSpPr>
-          <p:cNvPr id="93" name="Google Shape;93;p1"/>
+          <p:cNvPr id="93" name="Google Shape;93;g3a237dcfe8c_0_0"/>
           <p:cNvSpPr txBox="1"/>
           <p:nvPr>
             <p:ph type="ctrTitle"/>
@@ -12722,7 +12722,7 @@
       </p:sp>
       <p:sp>
         <p:nvSpPr>
-          <p:cNvPr id="94" name="Google Shape;94;p1"/>
+          <p:cNvPr id="94" name="Google Shape;94;g3a237dcfe8c_0_0"/>
           <p:cNvSpPr/>
           <p:nvPr/>
         </p:nvSpPr>
@@ -12780,7 +12780,7 @@
       </p:sp>
       <p:sp>
         <p:nvSpPr>
-          <p:cNvPr id="95" name="Google Shape;95;p1"/>
+          <p:cNvPr id="95" name="Google Shape;95;g3a237dcfe8c_0_0"/>
           <p:cNvSpPr txBox="1"/>
           <p:nvPr/>
         </p:nvSpPr>
@@ -13084,7 +13084,7 @@
       </p:sp>
       <p:sp>
         <p:nvSpPr>
-          <p:cNvPr id="96" name="Google Shape;96;p1"/>
+          <p:cNvPr id="96" name="Google Shape;96;g3a237dcfe8c_0_0"/>
           <p:cNvSpPr txBox="1"/>
           <p:nvPr/>
         </p:nvSpPr>
@@ -13246,7 +13246,7 @@
       </p:sp>
       <p:sp>
         <p:nvSpPr>
-          <p:cNvPr id="97" name="Google Shape;97;p1"/>
+          <p:cNvPr id="97" name="Google Shape;97;g3a237dcfe8c_0_0"/>
           <p:cNvSpPr txBox="1"/>
           <p:nvPr/>
         </p:nvSpPr>
@@ -13312,7 +13312,7 @@
       </p:sp>
       <p:sp>
         <p:nvSpPr>
-          <p:cNvPr id="98" name="Google Shape;98;p1"/>
+          <p:cNvPr id="98" name="Google Shape;98;g3a237dcfe8c_0_0"/>
           <p:cNvSpPr txBox="1"/>
           <p:nvPr/>
         </p:nvSpPr>
@@ -13476,7 +13476,7 @@
       </p:sp>
       <p:sp>
         <p:nvSpPr>
-          <p:cNvPr id="99" name="Google Shape;99;p1"/>
+          <p:cNvPr id="99" name="Google Shape;99;g3a237dcfe8c_0_0"/>
           <p:cNvSpPr txBox="1"/>
           <p:nvPr/>
         </p:nvSpPr>
@@ -13562,7 +13562,7 @@
       </p:sp>
       <p:pic>
         <p:nvPicPr>
-          <p:cNvPr descr="Uma imagem contendo óculos&#10;&#10;O conteúdo gerado por IA pode estar incorreto." id="100" name="Google Shape;100;p1"/>
+          <p:cNvPr descr="Uma imagem contendo óculos&#10;&#10;O conteúdo gerado por IA pode estar incorreto." id="100" name="Google Shape;100;g3a237dcfe8c_0_0"/>
           <p:cNvPicPr preferRelativeResize="0"/>
           <p:nvPr/>
         </p:nvPicPr>
@@ -13589,7 +13589,7 @@
       </p:pic>
       <p:pic>
         <p:nvPicPr>
-          <p:cNvPr descr="Uma imagem contendo óculos, caneca&#10;&#10;O conteúdo gerado por IA pode estar incorreto." id="101" name="Google Shape;101;p1"/>
+          <p:cNvPr descr="Uma imagem contendo óculos, caneca&#10;&#10;O conteúdo gerado por IA pode estar incorreto." id="101" name="Google Shape;101;g3a237dcfe8c_0_0"/>
           <p:cNvPicPr preferRelativeResize="0"/>
           <p:nvPr/>
         </p:nvPicPr>
@@ -13616,7 +13616,7 @@
       </p:pic>
       <p:pic>
         <p:nvPicPr>
-          <p:cNvPr descr="Ícone&#10;&#10;O conteúdo gerado por IA pode estar incorreto." id="102" name="Google Shape;102;p1"/>
+          <p:cNvPr descr="Ícone&#10;&#10;O conteúdo gerado por IA pode estar incorreto." id="102" name="Google Shape;102;g3a237dcfe8c_0_0"/>
           <p:cNvPicPr preferRelativeResize="0"/>
           <p:nvPr/>
         </p:nvPicPr>
@@ -13629,7 +13629,7 @@
         </p:blipFill>
         <p:spPr>
           <a:xfrm>
-            <a:off x="15947350" y="23640487"/>
+            <a:off x="18051875" y="18293800"/>
             <a:ext cx="5396874" cy="3963174"/>
           </a:xfrm>
           <a:prstGeom prst="rect">
@@ -13643,7 +13643,7 @@
       </p:pic>
       <p:pic>
         <p:nvPicPr>
-          <p:cNvPr descr="Ícone&#10;&#10;O conteúdo gerado por IA pode estar incorreto." id="103" name="Google Shape;103;p1"/>
+          <p:cNvPr id="103" name="Google Shape;103;g3a237dcfe8c_0_0" title="streamlit-logo-primary-colormark-darktext.png"/>
           <p:cNvPicPr preferRelativeResize="0"/>
           <p:nvPr/>
         </p:nvPicPr>
@@ -13651,13 +13651,13 @@
           <a:blip r:embed="rId7">
             <a:alphaModFix/>
           </a:blip>
-          <a:srcRect b="0" l="0" r="0" t="0"/>
+          <a:srcRect b="-16049" l="4636" r="4636" t="16050"/>
           <a:stretch/>
         </p:blipFill>
         <p:spPr>
           <a:xfrm>
-            <a:off x="16692799" y="18255612"/>
-            <a:ext cx="4651425" cy="4651496"/>
+            <a:off x="17677013" y="14970600"/>
+            <a:ext cx="10852634" cy="3323200"/>
           </a:xfrm>
           <a:prstGeom prst="rect">
             <a:avLst/>
@@ -13670,7 +13670,7 @@
       </p:pic>
       <p:pic>
         <p:nvPicPr>
-          <p:cNvPr id="104" name="Google Shape;104;p1" title="streamlit-logo-primary-colormark-darktext.png"/>
+          <p:cNvPr id="104" name="Google Shape;104;g3a237dcfe8c_0_0" title="Plotly_logo_for_digital_final_(6).png"/>
           <p:cNvPicPr preferRelativeResize="0"/>
           <p:nvPr/>
         </p:nvPicPr>
@@ -13678,13 +13678,13 @@
           <a:blip r:embed="rId8">
             <a:alphaModFix/>
           </a:blip>
-          <a:srcRect b="0" l="4962" r="4309" t="0"/>
+          <a:srcRect b="29298" l="6784" r="6784" t="21854"/>
           <a:stretch/>
         </p:blipFill>
         <p:spPr>
           <a:xfrm>
-            <a:off x="15947350" y="13817088"/>
-            <a:ext cx="12682798" cy="3883650"/>
+            <a:off x="19573238" y="22229063"/>
+            <a:ext cx="7060170" cy="2992088"/>
           </a:xfrm>
           <a:prstGeom prst="rect">
             <a:avLst/>
@@ -13697,21 +13697,22 @@
       </p:pic>
       <p:pic>
         <p:nvPicPr>
-          <p:cNvPr id="105" name="Google Shape;105;p1" title="Plotly_logo_for_digital_final_(6).png"/>
+          <p:cNvPr id="105" name="Google Shape;105;g3a237dcfe8c_0_0" title="vscode-logo.png"/>
           <p:cNvPicPr preferRelativeResize="0"/>
           <p:nvPr/>
         </p:nvPicPr>
-        <p:blipFill rotWithShape="1">
+        <p:blipFill>
           <a:blip r:embed="rId9">
             <a:alphaModFix/>
           </a:blip>
-          <a:srcRect b="27857" l="6655" r="6914" t="23295"/>
-          <a:stretch/>
+          <a:stretch>
+            <a:fillRect/>
+          </a:stretch>
         </p:blipFill>
         <p:spPr>
           <a:xfrm>
-            <a:off x="21344226" y="23899950"/>
-            <a:ext cx="7350799" cy="3115275"/>
+            <a:off x="24135150" y="18293788"/>
+            <a:ext cx="3323200" cy="3323200"/>
           </a:xfrm>
           <a:prstGeom prst="rect">
             <a:avLst/>
@@ -13724,7 +13725,7 @@
       </p:pic>
       <p:pic>
         <p:nvPicPr>
-          <p:cNvPr id="106" name="Google Shape;106;p1" title="vscode-logo.png"/>
+          <p:cNvPr id="106" name="Google Shape;106;g3a237dcfe8c_0_0" title="Pandas_logo.svg.png"/>
           <p:cNvPicPr preferRelativeResize="0"/>
           <p:nvPr/>
         </p:nvPicPr>
@@ -13738,8 +13739,8 @@
         </p:blipFill>
         <p:spPr>
           <a:xfrm>
-            <a:off x="22173750" y="18492475"/>
-            <a:ext cx="4177775" cy="4177775"/>
+            <a:off x="19257298" y="25576375"/>
+            <a:ext cx="7692042" cy="3115275"/>
           </a:xfrm>
           <a:prstGeom prst="rect">
             <a:avLst/>
@@ -13752,7 +13753,7 @@
       </p:pic>
       <p:pic>
         <p:nvPicPr>
-          <p:cNvPr id="107" name="Google Shape;107;p1" title="Captura de tela 2025-11-03 070841.png"/>
+          <p:cNvPr id="107" name="Google Shape;107;g3a237dcfe8c_0_0" title="Captura de tela 2025-11-10 204845.png"/>
           <p:cNvPicPr preferRelativeResize="0"/>
           <p:nvPr/>
         </p:nvPicPr>
@@ -13760,13 +13761,13 @@
           <a:blip r:embed="rId11">
             <a:alphaModFix/>
           </a:blip>
-          <a:srcRect b="0" l="0" r="0" t="15088"/>
+          <a:srcRect b="2269" l="0" r="17239" t="8389"/>
           <a:stretch/>
         </p:blipFill>
         <p:spPr>
           <a:xfrm>
-            <a:off x="1261587" y="22912700"/>
-            <a:ext cx="13978424" cy="8115751"/>
+            <a:off x="465450" y="13174601"/>
+            <a:ext cx="16900016" cy="8544650"/>
           </a:xfrm>
           <a:prstGeom prst="rect">
             <a:avLst/>
@@ -13779,7 +13780,7 @@
       </p:pic>
       <p:pic>
         <p:nvPicPr>
-          <p:cNvPr id="108" name="Google Shape;108;p1" title="Captura de tela 2025-11-03 070914.png"/>
+          <p:cNvPr id="108" name="Google Shape;108;g3a237dcfe8c_0_0" title="Captura de tela 2025-11-10 205022.png"/>
           <p:cNvPicPr preferRelativeResize="0"/>
           <p:nvPr/>
         </p:nvPicPr>
@@ -13787,41 +13788,13 @@
           <a:blip r:embed="rId12">
             <a:alphaModFix/>
           </a:blip>
-          <a:srcRect b="0" l="0" r="0" t="9820"/>
+          <a:srcRect b="4410" l="0" r="8617" t="-4410"/>
           <a:stretch/>
         </p:blipFill>
         <p:spPr>
           <a:xfrm>
-            <a:off x="1367638" y="13817100"/>
-            <a:ext cx="13766300" cy="7534350"/>
-          </a:xfrm>
-          <a:prstGeom prst="rect">
-            <a:avLst/>
-          </a:prstGeom>
-          <a:noFill/>
-          <a:ln>
-            <a:noFill/>
-          </a:ln>
-        </p:spPr>
-      </p:pic>
-      <p:pic>
-        <p:nvPicPr>
-          <p:cNvPr id="109" name="Google Shape;109;p1" title="Pandas_logo.svg.png"/>
-          <p:cNvPicPr preferRelativeResize="0"/>
-          <p:nvPr/>
-        </p:nvPicPr>
-        <p:blipFill>
-          <a:blip r:embed="rId13">
-            <a:alphaModFix/>
-          </a:blip>
-          <a:stretch>
-            <a:fillRect/>
-          </a:stretch>
-        </p:blipFill>
-        <p:spPr>
-          <a:xfrm>
-            <a:off x="17395938" y="27060147"/>
-            <a:ext cx="9785625" cy="3963177"/>
+            <a:off x="465450" y="23152400"/>
+            <a:ext cx="16900026" cy="7739600"/>
           </a:xfrm>
           <a:prstGeom prst="rect">
             <a:avLst/>

</xml_diff>